<commit_message>
add file apply sapotacorp and sun company
</commit_message>
<xml_diff>
--- a/CL-CV Editable to apply in Sun company.pptx
+++ b/CL-CV Editable to apply in Sun company.pptx
@@ -198,7 +198,7 @@
           <a:p>
             <a:fld id="{635715A5-0772-4E0B-AA45-ED948B68E97F}" type="datetimeFigureOut">
               <a:rPr lang="en-US" smtClean="0"/>
-              <a:t>3/7/2023</a:t>
+              <a:t>3/8/2023</a:t>
             </a:fld>
             <a:endParaRPr lang="en-US"/>
           </a:p>
@@ -681,7 +681,7 @@
           <a:p>
             <a:fld id="{633CFB94-3A9B-4BCC-97D0-AD2F45E975D2}" type="datetimeFigureOut">
               <a:rPr lang="en-US" smtClean="0"/>
-              <a:t>3/7/2023</a:t>
+              <a:t>3/8/2023</a:t>
             </a:fld>
             <a:endParaRPr lang="en-US"/>
           </a:p>
@@ -851,7 +851,7 @@
           <a:p>
             <a:fld id="{633CFB94-3A9B-4BCC-97D0-AD2F45E975D2}" type="datetimeFigureOut">
               <a:rPr lang="en-US" smtClean="0"/>
-              <a:t>3/7/2023</a:t>
+              <a:t>3/8/2023</a:t>
             </a:fld>
             <a:endParaRPr lang="en-US"/>
           </a:p>
@@ -1031,7 +1031,7 @@
           <a:p>
             <a:fld id="{633CFB94-3A9B-4BCC-97D0-AD2F45E975D2}" type="datetimeFigureOut">
               <a:rPr lang="en-US" smtClean="0"/>
-              <a:t>3/7/2023</a:t>
+              <a:t>3/8/2023</a:t>
             </a:fld>
             <a:endParaRPr lang="en-US"/>
           </a:p>
@@ -1201,7 +1201,7 @@
           <a:p>
             <a:fld id="{633CFB94-3A9B-4BCC-97D0-AD2F45E975D2}" type="datetimeFigureOut">
               <a:rPr lang="en-US" smtClean="0"/>
-              <a:t>3/7/2023</a:t>
+              <a:t>3/8/2023</a:t>
             </a:fld>
             <a:endParaRPr lang="en-US"/>
           </a:p>
@@ -1445,7 +1445,7 @@
           <a:p>
             <a:fld id="{633CFB94-3A9B-4BCC-97D0-AD2F45E975D2}" type="datetimeFigureOut">
               <a:rPr lang="en-US" smtClean="0"/>
-              <a:t>3/7/2023</a:t>
+              <a:t>3/8/2023</a:t>
             </a:fld>
             <a:endParaRPr lang="en-US"/>
           </a:p>
@@ -1677,7 +1677,7 @@
           <a:p>
             <a:fld id="{633CFB94-3A9B-4BCC-97D0-AD2F45E975D2}" type="datetimeFigureOut">
               <a:rPr lang="en-US" smtClean="0"/>
-              <a:t>3/7/2023</a:t>
+              <a:t>3/8/2023</a:t>
             </a:fld>
             <a:endParaRPr lang="en-US"/>
           </a:p>
@@ -2044,7 +2044,7 @@
           <a:p>
             <a:fld id="{633CFB94-3A9B-4BCC-97D0-AD2F45E975D2}" type="datetimeFigureOut">
               <a:rPr lang="en-US" smtClean="0"/>
-              <a:t>3/7/2023</a:t>
+              <a:t>3/8/2023</a:t>
             </a:fld>
             <a:endParaRPr lang="en-US"/>
           </a:p>
@@ -2162,7 +2162,7 @@
           <a:p>
             <a:fld id="{633CFB94-3A9B-4BCC-97D0-AD2F45E975D2}" type="datetimeFigureOut">
               <a:rPr lang="en-US" smtClean="0"/>
-              <a:t>3/7/2023</a:t>
+              <a:t>3/8/2023</a:t>
             </a:fld>
             <a:endParaRPr lang="en-US"/>
           </a:p>
@@ -2257,7 +2257,7 @@
           <a:p>
             <a:fld id="{633CFB94-3A9B-4BCC-97D0-AD2F45E975D2}" type="datetimeFigureOut">
               <a:rPr lang="en-US" smtClean="0"/>
-              <a:t>3/7/2023</a:t>
+              <a:t>3/8/2023</a:t>
             </a:fld>
             <a:endParaRPr lang="en-US"/>
           </a:p>
@@ -2534,7 +2534,7 @@
           <a:p>
             <a:fld id="{633CFB94-3A9B-4BCC-97D0-AD2F45E975D2}" type="datetimeFigureOut">
               <a:rPr lang="en-US" smtClean="0"/>
-              <a:t>3/7/2023</a:t>
+              <a:t>3/8/2023</a:t>
             </a:fld>
             <a:endParaRPr lang="en-US"/>
           </a:p>
@@ -2791,7 +2791,7 @@
           <a:p>
             <a:fld id="{633CFB94-3A9B-4BCC-97D0-AD2F45E975D2}" type="datetimeFigureOut">
               <a:rPr lang="en-US" smtClean="0"/>
-              <a:t>3/7/2023</a:t>
+              <a:t>3/8/2023</a:t>
             </a:fld>
             <a:endParaRPr lang="en-US"/>
           </a:p>
@@ -3004,7 +3004,7 @@
           <a:p>
             <a:fld id="{633CFB94-3A9B-4BCC-97D0-AD2F45E975D2}" type="datetimeFigureOut">
               <a:rPr lang="en-US" smtClean="0"/>
-              <a:t>3/7/2023</a:t>
+              <a:t>3/8/2023</a:t>
             </a:fld>
             <a:endParaRPr lang="en-US"/>
           </a:p>
@@ -3417,8 +3417,8 @@
         </p:nvSpPr>
         <p:spPr>
           <a:xfrm>
-            <a:off x="0" y="1296888"/>
-            <a:ext cx="8229600" cy="9941183"/>
+            <a:off x="317500" y="1513050"/>
+            <a:ext cx="7581900" cy="11172289"/>
           </a:xfrm>
           <a:prstGeom prst="rect">
             <a:avLst/>
@@ -3509,7 +3509,15 @@
             </a:r>
             <a:r>
               <a:rPr lang="en-US" sz="1600" dirty="0" smtClean="0"/>
-              <a:t>the Front-End </a:t>
+              <a:t>the </a:t>
+            </a:r>
+            <a:r>
+              <a:rPr lang="en-US" sz="1600" dirty="0" smtClean="0"/>
+              <a:t>Back</a:t>
+            </a:r>
+            <a:r>
+              <a:rPr lang="en-US" sz="1600" dirty="0" smtClean="0"/>
+              <a:t>-End </a:t>
             </a:r>
             <a:r>
               <a:rPr lang="en-US" sz="1600" dirty="0"/>
@@ -3738,11 +3746,11 @@
             </a:avLst>
           </a:prstGeom>
           <a:solidFill>
-            <a:srgbClr val="C01111"/>
+            <a:srgbClr val="F8DB03"/>
           </a:solidFill>
           <a:ln>
             <a:solidFill>
-              <a:srgbClr val="C01111"/>
+              <a:srgbClr val="F8DB03"/>
             </a:solidFill>
           </a:ln>
         </p:spPr>
@@ -3797,18 +3805,10 @@
           <a:lstStyle/>
           <a:p>
             <a:r>
-              <a:rPr lang="en-US" sz="4800" b="1" dirty="0" smtClean="0">
-                <a:solidFill>
-                  <a:srgbClr val="FFFFFF"/>
-                </a:solidFill>
-              </a:rPr>
+              <a:rPr lang="en-US" sz="4800" b="1" dirty="0" smtClean="0"/>
               <a:t>A THI</a:t>
             </a:r>
-            <a:endParaRPr lang="en-US" sz="4800" b="1" dirty="0">
-              <a:solidFill>
-                <a:srgbClr val="FFFFFF"/>
-              </a:solidFill>
-            </a:endParaRPr>
+            <a:endParaRPr lang="en-US" sz="4800" b="1" dirty="0"/>
           </a:p>
         </p:txBody>
       </p:sp>
@@ -3835,19 +3835,11 @@
           <a:lstStyle/>
           <a:p>
             <a:r>
-              <a:rPr lang="en-US" sz="2000" i="1" dirty="0" smtClean="0">
-                <a:solidFill>
-                  <a:srgbClr val="FFFFFF"/>
-                </a:solidFill>
-              </a:rPr>
+              <a:rPr lang="en-US" sz="2000" i="1" dirty="0" smtClean="0"/>
               <a:t>Back-End  </a:t>
             </a:r>
             <a:r>
-              <a:rPr lang="en-US" sz="2000" i="1" dirty="0">
-                <a:solidFill>
-                  <a:srgbClr val="FFFFFF"/>
-                </a:solidFill>
-              </a:rPr>
+              <a:rPr lang="en-US" sz="2000" i="1" dirty="0"/>
               <a:t>Intern</a:t>
             </a:r>
           </a:p>
@@ -4139,8 +4131,8 @@
         </p:nvSpPr>
         <p:spPr>
           <a:xfrm>
-            <a:off x="4093030" y="105458"/>
-            <a:ext cx="4281714" cy="1135696"/>
+            <a:off x="4389990" y="98751"/>
+            <a:ext cx="3839610" cy="1628138"/>
           </a:xfrm>
           <a:prstGeom prst="rect">
             <a:avLst/>
@@ -4177,40 +4169,82 @@
             </a:r>
           </a:p>
           <a:p>
-            <a:r>
-              <a:rPr lang="en-US" sz="1600" b="1" dirty="0" smtClean="0"/>
-              <a:t>Sun*</a:t>
-            </a:r>
-          </a:p>
-          <a:p>
-            <a:r>
-              <a:rPr lang="en-US" sz="1600" dirty="0"/>
-              <a:t>Ly </a:t>
-            </a:r>
-            <a:r>
-              <a:rPr lang="en-US" sz="1600" dirty="0" err="1"/>
-              <a:t>Thuong</a:t>
-            </a:r>
-            <a:r>
-              <a:rPr lang="en-US" sz="1600" dirty="0"/>
-              <a:t> </a:t>
-            </a:r>
-            <a:r>
-              <a:rPr lang="en-US" sz="1600" dirty="0" err="1"/>
-              <a:t>Kiet</a:t>
-            </a:r>
-            <a:r>
-              <a:rPr lang="en-US" sz="1600" dirty="0"/>
-              <a:t>, Hai Chau District, City. </a:t>
-            </a:r>
-            <a:r>
-              <a:rPr lang="en-US" sz="1600" dirty="0" err="1"/>
-              <a:t>Danang</a:t>
-            </a:r>
+            <a:endParaRPr lang="en-US" sz="1600" b="1" dirty="0" smtClean="0">
+              <a:ln>
+                <a:solidFill>
+                  <a:srgbClr val="C01111"/>
+                </a:solidFill>
+              </a:ln>
+              <a:solidFill>
+                <a:srgbClr val="C01111"/>
+              </a:solidFill>
+            </a:endParaRPr>
+          </a:p>
+          <a:p>
+            <a:endParaRPr lang="de-DE" sz="1600" dirty="0" smtClean="0">
+              <a:solidFill>
+                <a:srgbClr val="8F8F8F"/>
+              </a:solidFill>
+              <a:latin typeface="cerebri_sansmedium"/>
+            </a:endParaRPr>
+          </a:p>
+          <a:p>
+            <a:r>
+              <a:rPr lang="de-DE" sz="1600" dirty="0" smtClean="0">
+                <a:latin typeface="Calibri" panose="020F0502020204030204" pitchFamily="34" charset="0"/>
+                <a:cs typeface="Calibri" panose="020F0502020204030204" pitchFamily="34" charset="0"/>
+              </a:rPr>
+              <a:t>Huynh Tan Phat, Hai Chau, Da Nang </a:t>
+            </a:r>
+          </a:p>
+          <a:p>
             <a:endParaRPr lang="en-US" sz="1600" dirty="0"/>
           </a:p>
         </p:txBody>
       </p:sp>
+      <p:pic>
+        <p:nvPicPr>
+          <p:cNvPr id="1026" name="Picture 2" descr="https://www.sapotacorp.vn/assets/img/sapota/logocty1-1.png">
+            <a:hlinkClick r:id="rId3"/>
+          </p:cNvPr>
+          <p:cNvPicPr>
+            <a:picLocks noChangeAspect="1" noChangeArrowheads="1"/>
+          </p:cNvPicPr>
+          <p:nvPr/>
+        </p:nvPicPr>
+        <p:blipFill>
+          <a:blip r:embed="rId4" cstate="print">
+            <a:extLst>
+              <a:ext uri="{28A0092B-C50C-407E-A947-70E740481C1C}">
+                <a14:useLocalDpi xmlns:a14="http://schemas.microsoft.com/office/drawing/2010/main" val="0"/>
+              </a:ext>
+            </a:extLst>
+          </a:blip>
+          <a:srcRect/>
+          <a:stretch>
+            <a:fillRect/>
+          </a:stretch>
+        </p:blipFill>
+        <p:spPr bwMode="auto">
+          <a:xfrm>
+            <a:off x="4467405" y="707910"/>
+            <a:ext cx="2000270" cy="488272"/>
+          </a:xfrm>
+          <a:prstGeom prst="rect">
+            <a:avLst/>
+          </a:prstGeom>
+          <a:noFill/>
+          <a:extLst>
+            <a:ext uri="{909E8E84-426E-40DD-AFC4-6F175D3DCCD1}">
+              <a14:hiddenFill xmlns:a14="http://schemas.microsoft.com/office/drawing/2010/main">
+                <a:solidFill>
+                  <a:srgbClr val="FFFFFF"/>
+                </a:solidFill>
+              </a14:hiddenFill>
+            </a:ext>
+          </a:extLst>
+        </p:spPr>
+      </p:pic>
     </p:spTree>
     <p:extLst>
       <p:ext uri="{BB962C8B-B14F-4D97-AF65-F5344CB8AC3E}">
@@ -4250,122 +4284,26 @@
       </p:grpSpPr>
       <p:sp>
         <p:nvSpPr>
-          <p:cNvPr id="55" name="Oval 54"/>
-          <p:cNvSpPr/>
+          <p:cNvPr id="4" name="Rectangle 3"/>
+          <p:cNvSpPr>
+            <a:spLocks/>
+          </p:cNvSpPr>
           <p:nvPr/>
         </p:nvSpPr>
         <p:spPr>
           <a:xfrm>
-            <a:off x="2581471" y="11023964"/>
-            <a:ext cx="329184" cy="329184"/>
-          </a:xfrm>
-          <a:prstGeom prst="ellipse">
-            <a:avLst/>
-          </a:prstGeom>
-          <a:solidFill>
-            <a:srgbClr val="C01111"/>
-          </a:solidFill>
-          <a:ln>
-            <a:solidFill>
-              <a:srgbClr val="C01111"/>
-            </a:solidFill>
-          </a:ln>
-        </p:spPr>
-        <p:style>
-          <a:lnRef idx="2">
-            <a:schemeClr val="accent1">
-              <a:shade val="50000"/>
-            </a:schemeClr>
-          </a:lnRef>
-          <a:fillRef idx="1">
-            <a:schemeClr val="accent1"/>
-          </a:fillRef>
-          <a:effectRef idx="0">
-            <a:schemeClr val="accent1"/>
-          </a:effectRef>
-          <a:fontRef idx="minor">
-            <a:schemeClr val="lt1"/>
-          </a:fontRef>
-        </p:style>
-        <p:txBody>
-          <a:bodyPr rtlCol="0" anchor="ctr"/>
-          <a:lstStyle/>
-          <a:p>
-            <a:pPr algn="ctr"/>
-            <a:endParaRPr lang="en-US" sz="2160"/>
-          </a:p>
-        </p:txBody>
-      </p:sp>
-      <p:sp>
-        <p:nvSpPr>
-          <p:cNvPr id="54" name="Oval 53"/>
-          <p:cNvSpPr/>
-          <p:nvPr/>
-        </p:nvSpPr>
-        <p:spPr>
-          <a:xfrm>
-            <a:off x="2581471" y="11437434"/>
-            <a:ext cx="329184" cy="329184"/>
-          </a:xfrm>
-          <a:prstGeom prst="ellipse">
-            <a:avLst/>
-          </a:prstGeom>
-          <a:solidFill>
-            <a:srgbClr val="C01111"/>
-          </a:solidFill>
-          <a:ln>
-            <a:solidFill>
-              <a:srgbClr val="C01111"/>
-            </a:solidFill>
-          </a:ln>
-        </p:spPr>
-        <p:style>
-          <a:lnRef idx="2">
-            <a:schemeClr val="accent1">
-              <a:shade val="50000"/>
-            </a:schemeClr>
-          </a:lnRef>
-          <a:fillRef idx="1">
-            <a:schemeClr val="accent1"/>
-          </a:fillRef>
-          <a:effectRef idx="0">
-            <a:schemeClr val="accent1"/>
-          </a:effectRef>
-          <a:fontRef idx="minor">
-            <a:schemeClr val="lt1"/>
-          </a:fontRef>
-        </p:style>
-        <p:txBody>
-          <a:bodyPr rtlCol="0" anchor="ctr"/>
-          <a:lstStyle/>
-          <a:p>
-            <a:pPr algn="ctr"/>
-            <a:endParaRPr lang="en-US" sz="2160"/>
-          </a:p>
-        </p:txBody>
-      </p:sp>
-      <p:sp>
-        <p:nvSpPr>
-          <p:cNvPr id="4" name="Rectangle 3"/>
-          <p:cNvSpPr>
-            <a:spLocks/>
-          </p:cNvSpPr>
-          <p:nvPr/>
-        </p:nvSpPr>
-        <p:spPr>
-          <a:xfrm>
-            <a:off x="2350598" y="1151"/>
+            <a:off x="2335850" y="4326"/>
             <a:ext cx="5879002" cy="1976989"/>
           </a:xfrm>
           <a:prstGeom prst="rect">
             <a:avLst/>
           </a:prstGeom>
           <a:solidFill>
-            <a:srgbClr val="C01111"/>
+            <a:srgbClr val="2B3441"/>
           </a:solidFill>
           <a:ln>
             <a:solidFill>
-              <a:srgbClr val="C01111"/>
+              <a:srgbClr val="2B3441"/>
             </a:solidFill>
           </a:ln>
         </p:spPr>
@@ -4492,8 +4430,13 @@
               <a:p>
                 <a:r>
                   <a:rPr lang="en-US" sz="4800" b="1" dirty="0">
+                    <a:ln>
+                      <a:solidFill>
+                        <a:srgbClr val="FAD30C"/>
+                      </a:solidFill>
+                    </a:ln>
                     <a:solidFill>
-                      <a:schemeClr val="bg1"/>
+                      <a:srgbClr val="FAD30C"/>
                     </a:solidFill>
                   </a:rPr>
                   <a:t>A THI</a:t>
@@ -4542,15 +4485,25 @@
               <a:p>
                 <a:r>
                   <a:rPr lang="en-US" sz="1800" i="1" dirty="0" smtClean="0">
+                    <a:ln>
+                      <a:solidFill>
+                        <a:srgbClr val="FAD30C"/>
+                      </a:solidFill>
+                    </a:ln>
                     <a:solidFill>
-                      <a:schemeClr val="bg1"/>
+                      <a:srgbClr val="FAD30C"/>
                     </a:solidFill>
                   </a:rPr>
                   <a:t>Back-End  Intern</a:t>
                 </a:r>
                 <a:endParaRPr lang="en-US" sz="1800" i="1" dirty="0">
+                  <a:ln>
+                    <a:solidFill>
+                      <a:srgbClr val="FAD30C"/>
+                    </a:solidFill>
+                  </a:ln>
                   <a:solidFill>
-                    <a:schemeClr val="bg1"/>
+                    <a:srgbClr val="FAD30C"/>
                   </a:solidFill>
                 </a:endParaRPr>
               </a:p>
@@ -4614,11 +4567,11 @@
                     <a:avLst/>
                   </a:prstGeom>
                   <a:solidFill>
-                    <a:srgbClr val="FFFFFF"/>
+                    <a:srgbClr val="FAD30C"/>
                   </a:solidFill>
                   <a:ln>
                     <a:solidFill>
-                      <a:srgbClr val="FFFFFF"/>
+                      <a:srgbClr val="FAD30C"/>
                     </a:solidFill>
                   </a:ln>
                 </p:spPr>
@@ -4722,11 +4675,11 @@
                     <a:avLst/>
                   </a:prstGeom>
                   <a:solidFill>
-                    <a:srgbClr val="FFFFFF"/>
+                    <a:srgbClr val="FAD30C"/>
                   </a:solidFill>
                   <a:ln>
                     <a:solidFill>
-                      <a:srgbClr val="FFFFFF"/>
+                      <a:srgbClr val="FAD30C"/>
                     </a:solidFill>
                   </a:ln>
                 </p:spPr>
@@ -4826,11 +4779,11 @@
                     <a:avLst/>
                   </a:prstGeom>
                   <a:solidFill>
-                    <a:srgbClr val="FFFFFF"/>
+                    <a:srgbClr val="FAD30C"/>
                   </a:solidFill>
                   <a:ln>
                     <a:solidFill>
-                      <a:srgbClr val="FFFFFF"/>
+                      <a:srgbClr val="FAD30C"/>
                     </a:solidFill>
                   </a:ln>
                 </p:spPr>
@@ -5222,27 +5175,27 @@
                   <a:srgbClr val="222224"/>
                 </a:solidFill>
               </a:rPr>
-              <a:t>              </a:t>
+              <a:t>             </a:t>
             </a:r>
             <a:r>
               <a:rPr lang="en-US" sz="1600" b="1" dirty="0">
                 <a:solidFill>
-                  <a:srgbClr val="C01111"/>
-                </a:solidFill>
-              </a:rPr>
-              <a:t>IT </a:t>
+                  <a:srgbClr val="FAD30C"/>
+                </a:solidFill>
+              </a:rPr>
+              <a:t> IT </a:t>
             </a:r>
             <a:r>
               <a:rPr lang="en-US" sz="1600" b="1" dirty="0" smtClean="0">
                 <a:solidFill>
-                  <a:srgbClr val="C01111"/>
+                  <a:srgbClr val="FAD30C"/>
                 </a:solidFill>
               </a:rPr>
               <a:t>Trainer</a:t>
             </a:r>
             <a:endParaRPr lang="en-US" sz="1600" b="1" dirty="0">
               <a:solidFill>
-                <a:srgbClr val="C01111"/>
+                <a:srgbClr val="FAD30C"/>
               </a:solidFill>
             </a:endParaRPr>
           </a:p>
@@ -5548,7 +5501,7 @@
             <a:r>
               <a:rPr lang="en-US" sz="1600" b="1" dirty="0" smtClean="0">
                 <a:solidFill>
-                  <a:srgbClr val="C01111"/>
+                  <a:srgbClr val="FAD30C"/>
                 </a:solidFill>
               </a:rPr>
               <a:t>RESTAURANT MANAGEMENT </a:t>
@@ -5674,7 +5627,7 @@
             <a:r>
               <a:rPr lang="en-US" sz="1600" b="1" dirty="0">
                 <a:solidFill>
-                  <a:srgbClr val="C01111"/>
+                  <a:srgbClr val="FAD30C"/>
                 </a:solidFill>
               </a:rPr>
               <a:t>COSMETICS SELL </a:t>
@@ -5682,7 +5635,7 @@
             <a:r>
               <a:rPr lang="en-US" sz="1600" b="1" dirty="0" smtClean="0">
                 <a:solidFill>
-                  <a:srgbClr val="C01111"/>
+                  <a:srgbClr val="FAD30C"/>
                 </a:solidFill>
               </a:rPr>
               <a:t>WEBSITE</a:t>
@@ -5803,12 +5756,14 @@
         </p:nvGrpSpPr>
         <p:grpSpPr>
           <a:xfrm>
-            <a:off x="2581471" y="11421013"/>
+            <a:off x="2577246" y="11465973"/>
             <a:ext cx="329184" cy="329184"/>
             <a:chOff x="4092575" y="3551237"/>
             <a:chExt cx="222250" cy="222250"/>
           </a:xfrm>
-          <a:noFill/>
+          <a:solidFill>
+            <a:srgbClr val="FAD30C"/>
+          </a:solidFill>
         </p:grpSpPr>
         <p:sp>
           <p:nvSpPr>
@@ -5826,7 +5781,9 @@
             </a:prstGeom>
             <a:grpFill/>
             <a:ln>
-              <a:noFill/>
+              <a:solidFill>
+                <a:srgbClr val="FAD30C"/>
+              </a:solidFill>
             </a:ln>
           </p:spPr>
           <p:style>
@@ -5885,7 +5842,9 @@
             </a:prstGeom>
             <a:grpFill/>
             <a:ln>
-              <a:noFill/>
+              <a:solidFill>
+                <a:srgbClr val="FAD30C"/>
+              </a:solidFill>
             </a:ln>
             <a:extLst/>
           </p:spPr>
@@ -5899,12 +5858,14 @@
         </p:nvGrpSpPr>
         <p:grpSpPr>
           <a:xfrm>
-            <a:off x="2569413" y="11047633"/>
+            <a:off x="2581471" y="11051481"/>
             <a:ext cx="329184" cy="329184"/>
             <a:chOff x="4622847" y="3092169"/>
             <a:chExt cx="222250" cy="222250"/>
           </a:xfrm>
-          <a:noFill/>
+          <a:solidFill>
+            <a:srgbClr val="FAD30C"/>
+          </a:solidFill>
         </p:grpSpPr>
         <p:sp>
           <p:nvSpPr>
@@ -5922,7 +5883,9 @@
             </a:prstGeom>
             <a:grpFill/>
             <a:ln>
-              <a:noFill/>
+              <a:solidFill>
+                <a:srgbClr val="FAD30C"/>
+              </a:solidFill>
             </a:ln>
           </p:spPr>
           <p:style>
@@ -5981,7 +5944,9 @@
             </a:prstGeom>
             <a:grpFill/>
             <a:ln>
-              <a:noFill/>
+              <a:solidFill>
+                <a:srgbClr val="FAD30C"/>
+              </a:solidFill>
             </a:ln>
             <a:extLst/>
           </p:spPr>
@@ -5995,18 +5960,18 @@
         </p:nvSpPr>
         <p:spPr>
           <a:xfrm rot="10800000">
-            <a:off x="3172" y="-7"/>
+            <a:off x="2712" y="2374"/>
             <a:ext cx="2360126" cy="1968621"/>
           </a:xfrm>
           <a:prstGeom prst="rtTriangle">
             <a:avLst/>
           </a:prstGeom>
           <a:solidFill>
-            <a:srgbClr val="C01111"/>
+            <a:srgbClr val="FAD30C"/>
           </a:solidFill>
           <a:ln>
             <a:solidFill>
-              <a:srgbClr val="C01111"/>
+              <a:srgbClr val="FAD30C"/>
             </a:solidFill>
           </a:ln>
         </p:spPr>
@@ -6297,10 +6262,18 @@
             <a:r>
               <a:rPr lang="en-US" sz="1600" b="1" dirty="0" smtClean="0">
                 <a:solidFill>
+                  <a:srgbClr val="FAD30C"/>
+                </a:solidFill>
+              </a:rPr>
+              <a:t>DOCTOR BOOKING WEB</a:t>
+            </a:r>
+            <a:r>
+              <a:rPr lang="en-US" sz="1600" b="1" dirty="0" smtClean="0">
+                <a:solidFill>
                   <a:srgbClr val="C01111"/>
                 </a:solidFill>
               </a:rPr>
-              <a:t>DOCTOR BOOKING WEB                                  </a:t>
+              <a:t>                                  </a:t>
             </a:r>
             <a:r>
               <a:rPr lang="en-US" sz="1600" b="1" dirty="0" smtClean="0">

</xml_diff>